<commit_message>
feat: pros and cons of studying abroad.pdf
</commit_message>
<xml_diff>
--- a/Advantages and Disadvantages studying abroad.pptx
+++ b/Advantages and Disadvantages studying abroad.pptx
@@ -3605,10 +3605,10 @@
           </a:bodyPr>
           <a:p>
             <a:r>
-              <a:rPr lang="" altLang="en-US"/>
+              <a:rPr lang="en-US" altLang="en-US"/>
               <a:t>Advantages and Disadvantages of studying abroad</a:t>
             </a:r>
-            <a:endParaRPr lang="" altLang="en-US"/>
+            <a:endParaRPr lang="en-US" altLang="en-US"/>
           </a:p>
         </p:txBody>
       </p:sp>
@@ -3687,12 +3687,12 @@
               <a:t>Advantages: </a:t>
             </a:r>
             <a:r>
-              <a:rPr lang="" altLang="en-US" sz="3200" b="0">
+              <a:rPr lang="en-US" altLang="en-US" sz="3200" b="0">
                 <a:sym typeface="+mn-ea"/>
               </a:rPr>
               <a:t>International experience</a:t>
             </a:r>
-            <a:endParaRPr lang="" altLang="en-US" sz="3200" b="0">
+            <a:endParaRPr lang="en-US" altLang="en-US" sz="3200" b="0">
               <a:sym typeface="+mn-ea"/>
             </a:endParaRPr>
           </a:p>
@@ -3906,18 +3906,10 @@
           <a:p>
             <a:pPr algn="ctr"/>
             <a:r>
-              <a:rPr lang="" altLang="en-US" sz="3200" b="0"/>
-              <a:t>Disa</a:t>
-            </a:r>
-            <a:r>
               <a:rPr lang="en-US" altLang="en-US" sz="3200" b="0"/>
-              <a:t>dvantages: </a:t>
-            </a:r>
-            <a:r>
-              <a:rPr lang="" altLang="en-US" sz="3200" b="0"/>
-              <a:t>Cost</a:t>
-            </a:r>
-            <a:endParaRPr lang="" altLang="en-US" sz="3200" b="0"/>
+              <a:t>Disadvantages: Cost</a:t>
+            </a:r>
+            <a:endParaRPr lang="en-US" altLang="en-US" sz="3200" b="0"/>
           </a:p>
         </p:txBody>
       </p:sp>
@@ -4057,7 +4049,7 @@
               <a:t>If you do not know the </a:t>
             </a:r>
             <a:r>
-              <a:rPr lang="" altLang="en-US" sz="4400"/>
+              <a:rPr lang="en-US" altLang="en-US" sz="4400"/>
               <a:t>primary </a:t>
             </a:r>
             <a:r>
@@ -4139,12 +4131,8 @@
           <a:p>
             <a:pPr algn="ctr"/>
             <a:r>
-              <a:rPr lang="" altLang="en-US" sz="3200" b="0"/>
-              <a:t>Disa</a:t>
-            </a:r>
-            <a:r>
               <a:rPr lang="en-US" altLang="en-US" sz="3200" b="0"/>
-              <a:t>dvantages: </a:t>
+              <a:t>Disadvantages: </a:t>
             </a:r>
             <a:r>
               <a:rPr lang="en-US" altLang="en-US" sz="3200" b="0">
@@ -4295,10 +4283,10 @@
               <a:rPr lang="en-US" sz="4400"/>
             </a:br>
             <a:r>
-              <a:rPr lang="" altLang="en-US" sz="4400"/>
+              <a:rPr lang="en-US" altLang="en-US" sz="4400"/>
               <a:t>Go to next slide</a:t>
             </a:r>
-            <a:endParaRPr lang="" altLang="en-US" sz="4400"/>
+            <a:endParaRPr lang="en-US" altLang="en-US" sz="4400"/>
           </a:p>
         </p:txBody>
       </p:sp>
@@ -4739,10 +4727,10 @@
               <a:t>If you find it difficult to study in your country, you cannot study abroad at all</a:t>
             </a:r>
             <a:r>
-              <a:rPr lang="" altLang="en-US" sz="4400"/>
+              <a:rPr lang="en-US" altLang="en-US" sz="4400"/>
               <a:t>.</a:t>
             </a:r>
-            <a:endParaRPr lang="" altLang="en-US" sz="4400"/>
+            <a:endParaRPr lang="en-US" altLang="en-US" sz="4400"/>
           </a:p>
         </p:txBody>
       </p:sp>
@@ -4818,11 +4806,29 @@
           </a:xfrm>
         </p:spPr>
         <p:txBody>
-          <a:bodyPr/>
+          <a:bodyPr>
+            <a:normAutofit fontScale="90000"/>
+          </a:bodyPr>
           <a:p>
             <a:r>
               <a:rPr lang="en-US" altLang="en-US" sz="4800"/>
-              <a:t>I want to tell 5 advantages and 5 disadvantages of studying abroad</a:t>
+              <a:t>I </a:t>
+            </a:r>
+            <a:r>
+              <a:rPr lang="" altLang="en-US" sz="4800"/>
+              <a:t>going t</a:t>
+            </a:r>
+            <a:r>
+              <a:rPr lang="en-US" altLang="en-US" sz="4800"/>
+              <a:t>o </a:t>
+            </a:r>
+            <a:r>
+              <a:rPr lang="" altLang="en-US" sz="4800"/>
+              <a:t>speak about</a:t>
+            </a:r>
+            <a:r>
+              <a:rPr lang="en-US" altLang="en-US" sz="4800"/>
+              <a:t> 5 advantages and 5 disadvantages of studying abroad</a:t>
             </a:r>
             <a:endParaRPr lang="en-US" altLang="en-US" sz="4800"/>
           </a:p>
@@ -5036,17 +5042,17 @@
           <a:bodyPr/>
           <a:p>
             <a:r>
-              <a:rPr lang="" altLang="en-US" sz="6600"/>
+              <a:rPr lang="en-US" altLang="en-US" sz="6600"/>
               <a:t>Thank you </a:t>
             </a:r>
             <a:br>
-              <a:rPr lang="" altLang="en-US" sz="6600"/>
+              <a:rPr lang="en-US" altLang="en-US" sz="6600"/>
             </a:br>
             <a:r>
-              <a:rPr lang="" altLang="en-US" sz="6600"/>
+              <a:rPr lang="en-US" altLang="en-US" sz="6600"/>
               <a:t>for your attention</a:t>
             </a:r>
-            <a:endParaRPr lang="" altLang="en-US" sz="6600"/>
+            <a:endParaRPr lang="en-US" altLang="en-US" sz="6600"/>
           </a:p>
         </p:txBody>
       </p:sp>
@@ -5203,10 +5209,10 @@
           <a:p>
             <a:pPr algn="ctr"/>
             <a:r>
-              <a:rPr lang="" altLang="en-US" sz="3200" b="0"/>
+              <a:rPr lang="en-US" altLang="en-US" sz="3200" b="0"/>
               <a:t>Advantages: You may know different cultures</a:t>
             </a:r>
-            <a:endParaRPr lang="" altLang="en-US" sz="3200" b="0"/>
+            <a:endParaRPr lang="en-US" altLang="en-US" sz="3200" b="0"/>
           </a:p>
         </p:txBody>
       </p:sp>
@@ -5341,7 +5347,7 @@
           <a:p>
             <a:r>
               <a:rPr lang="en-US" altLang="en-US" sz="4800"/>
-              <a:t>If you are not satisfied with the education in your home country, you should study abroad.</a:t>
+              <a:t>If you are not satisfied with the education in your country, you should study abroad.</a:t>
             </a:r>
             <a:endParaRPr lang="en-US" altLang="en-US" sz="4800"/>
           </a:p>
@@ -5478,7 +5484,7 @@
               <a:rPr lang="en-US" sz="2800">
                 <a:sym typeface="+mn-ea"/>
               </a:rPr>
-              <a:t>Many universities and colleges abroad offer unique academic programs, courses, and research opportunities that may not be available in your home country. </a:t>
+              <a:t>Many universities and colleges abroad offer unique academic programs, courses, and research opportunities that may not be available in your country. </a:t>
             </a:r>
             <a:endParaRPr lang="en-US" sz="2800">
               <a:sym typeface="+mn-ea"/>

</xml_diff>